<commit_message>
updated page for webcam
</commit_message>
<xml_diff>
--- a/flying_drones_with_gestures.pptx
+++ b/flying_drones_with_gestures.pptx
@@ -5,13 +5,14 @@
     <p:sldMasterId id="2147483648" r:id="rId4"/>
   </p:sldMasterIdLst>
   <p:notesMasterIdLst>
-    <p:notesMasterId r:id="rId9"/>
+    <p:notesMasterId r:id="rId10"/>
   </p:notesMasterIdLst>
   <p:sldIdLst>
     <p:sldId id="272" r:id="rId5"/>
     <p:sldId id="285" r:id="rId6"/>
     <p:sldId id="286" r:id="rId7"/>
-    <p:sldId id="271" r:id="rId8"/>
+    <p:sldId id="287" r:id="rId8"/>
+    <p:sldId id="271" r:id="rId9"/>
   </p:sldIdLst>
   <p:sldSz cx="12192000" cy="6858000"/>
   <p:notesSz cx="6858000" cy="9144000"/>
@@ -1112,7 +1113,7 @@
           <a:p>
             <a:fld id="{96B78F0C-DB03-4D08-9059-9979641CEEA3}" type="datetimeFigureOut">
               <a:rPr lang="en-US" smtClean="0"/>
-              <a:t>10/1/2018</a:t>
+              <a:t>10/2/2018</a:t>
             </a:fld>
             <a:endParaRPr lang="en-US"/>
           </a:p>
@@ -9190,7 +9191,7 @@
           <a:p>
             <a:fld id="{C21147C8-3BDC-4528-8DD9-1CA3516CDAE4}" type="datetime4">
               <a:rPr lang="en-US" smtClean="0"/>
-              <a:t>October 1, 2018</a:t>
+              <a:t>October 2, 2018</a:t>
             </a:fld>
             <a:endParaRPr lang="en-US" dirty="0"/>
           </a:p>
@@ -10977,7 +10978,7 @@
           <a:p>
             <a:fld id="{E7720AB0-D943-4E26-B0C0-37EB45539734}" type="datetime4">
               <a:rPr lang="en-US" smtClean="0"/>
-              <a:t>October 1, 2018</a:t>
+              <a:t>October 2, 2018</a:t>
             </a:fld>
             <a:endParaRPr lang="en-US"/>
           </a:p>
@@ -19595,6 +19596,913 @@
 </file>
 
 <file path=ppt/slides/slide4.xml><?xml version="1.0" encoding="utf-8"?>
+<p:sld xmlns:a="http://schemas.openxmlformats.org/drawingml/2006/main" xmlns:r="http://schemas.openxmlformats.org/officeDocument/2006/relationships" xmlns:p="http://schemas.openxmlformats.org/presentationml/2006/main">
+  <p:cSld>
+    <p:spTree>
+      <p:nvGrpSpPr>
+        <p:cNvPr id="1" name=""/>
+        <p:cNvGrpSpPr/>
+        <p:nvPr/>
+      </p:nvGrpSpPr>
+      <p:grpSpPr>
+        <a:xfrm>
+          <a:off x="0" y="0"/>
+          <a:ext cx="0" cy="0"/>
+          <a:chOff x="0" y="0"/>
+          <a:chExt cx="0" cy="0"/>
+        </a:xfrm>
+      </p:grpSpPr>
+      <p:sp>
+        <p:nvSpPr>
+          <p:cNvPr id="3" name="Title 2">
+            <a:extLst>
+              <a:ext uri="{FF2B5EF4-FFF2-40B4-BE49-F238E27FC236}">
+                <a16:creationId xmlns:a16="http://schemas.microsoft.com/office/drawing/2014/main" id="{A9253D77-EC89-457C-99F6-299AB33512BB}"/>
+              </a:ext>
+            </a:extLst>
+          </p:cNvPr>
+          <p:cNvSpPr>
+            <a:spLocks noGrp="1"/>
+          </p:cNvSpPr>
+          <p:nvPr>
+            <p:ph type="title"/>
+          </p:nvPr>
+        </p:nvSpPr>
+        <p:spPr/>
+        <p:txBody>
+          <a:bodyPr>
+            <a:normAutofit fontScale="90000"/>
+          </a:bodyPr>
+          <a:lstStyle/>
+          <a:p>
+            <a:r>
+              <a:rPr lang="de-CH" dirty="0" err="1"/>
+              <a:t>Gestures</a:t>
+            </a:r>
+            <a:endParaRPr lang="de-CH" dirty="0"/>
+          </a:p>
+        </p:txBody>
+      </p:sp>
+      <p:sp>
+        <p:nvSpPr>
+          <p:cNvPr id="4" name="Footer Placeholder 3">
+            <a:extLst>
+              <a:ext uri="{FF2B5EF4-FFF2-40B4-BE49-F238E27FC236}">
+                <a16:creationId xmlns:a16="http://schemas.microsoft.com/office/drawing/2014/main" id="{22143C23-BC92-444A-875B-C25A121CDED3}"/>
+              </a:ext>
+            </a:extLst>
+          </p:cNvPr>
+          <p:cNvSpPr>
+            <a:spLocks noGrp="1"/>
+          </p:cNvSpPr>
+          <p:nvPr>
+            <p:ph type="ftr" sz="quarter" idx="11"/>
+          </p:nvPr>
+        </p:nvSpPr>
+        <p:spPr/>
+        <p:txBody>
+          <a:bodyPr/>
+          <a:lstStyle/>
+          <a:p>
+            <a:r>
+              <a:rPr lang="en-US"/>
+              <a:t>Confidential</a:t>
+            </a:r>
+          </a:p>
+        </p:txBody>
+      </p:sp>
+      <p:sp>
+        <p:nvSpPr>
+          <p:cNvPr id="5" name="Slide Number Placeholder 4">
+            <a:extLst>
+              <a:ext uri="{FF2B5EF4-FFF2-40B4-BE49-F238E27FC236}">
+                <a16:creationId xmlns:a16="http://schemas.microsoft.com/office/drawing/2014/main" id="{3A2A659F-A783-4AE7-BD4E-377371AF4DBC}"/>
+              </a:ext>
+            </a:extLst>
+          </p:cNvPr>
+          <p:cNvSpPr>
+            <a:spLocks noGrp="1"/>
+          </p:cNvSpPr>
+          <p:nvPr>
+            <p:ph type="sldNum" sz="quarter" idx="12"/>
+          </p:nvPr>
+        </p:nvSpPr>
+        <p:spPr/>
+        <p:txBody>
+          <a:bodyPr/>
+          <a:lstStyle/>
+          <a:p>
+            <a:fld id="{0D3FE423-99AA-8A44-92E3-1EA415DCE0E9}" type="slidenum">
+              <a:rPr lang="en-US" smtClean="0"/>
+              <a:pPr/>
+              <a:t>4</a:t>
+            </a:fld>
+            <a:endParaRPr lang="en-US" dirty="0"/>
+          </a:p>
+        </p:txBody>
+      </p:sp>
+      <p:pic>
+        <p:nvPicPr>
+          <p:cNvPr id="7" name="Picture 6">
+            <a:extLst>
+              <a:ext uri="{FF2B5EF4-FFF2-40B4-BE49-F238E27FC236}">
+                <a16:creationId xmlns:a16="http://schemas.microsoft.com/office/drawing/2014/main" id="{98C7D362-4ACE-4AED-830D-D57A470A4D43}"/>
+              </a:ext>
+            </a:extLst>
+          </p:cNvPr>
+          <p:cNvPicPr>
+            <a:picLocks noChangeAspect="1"/>
+          </p:cNvPicPr>
+          <p:nvPr/>
+        </p:nvPicPr>
+        <p:blipFill rotWithShape="1">
+          <a:blip r:embed="rId2"/>
+          <a:srcRect l="26458" r="26340"/>
+          <a:stretch/>
+        </p:blipFill>
+        <p:spPr>
+          <a:xfrm>
+            <a:off x="9883639" y="1831610"/>
+            <a:ext cx="359725" cy="762084"/>
+          </a:xfrm>
+          <a:prstGeom prst="rect">
+            <a:avLst/>
+          </a:prstGeom>
+        </p:spPr>
+      </p:pic>
+      <p:grpSp>
+        <p:nvGrpSpPr>
+          <p:cNvPr id="8" name="Group 7">
+            <a:extLst>
+              <a:ext uri="{FF2B5EF4-FFF2-40B4-BE49-F238E27FC236}">
+                <a16:creationId xmlns:a16="http://schemas.microsoft.com/office/drawing/2014/main" id="{60B383A6-0BCD-49A3-AAC8-238473A71C63}"/>
+              </a:ext>
+            </a:extLst>
+          </p:cNvPr>
+          <p:cNvGrpSpPr/>
+          <p:nvPr/>
+        </p:nvGrpSpPr>
+        <p:grpSpPr>
+          <a:xfrm>
+            <a:off x="5408792" y="1843642"/>
+            <a:ext cx="773020" cy="762083"/>
+            <a:chOff x="5408791" y="1858882"/>
+            <a:chExt cx="1745207" cy="1720516"/>
+          </a:xfrm>
+        </p:grpSpPr>
+        <p:pic>
+          <p:nvPicPr>
+            <p:cNvPr id="9" name="Picture 8">
+              <a:extLst>
+                <a:ext uri="{FF2B5EF4-FFF2-40B4-BE49-F238E27FC236}">
+                  <a16:creationId xmlns:a16="http://schemas.microsoft.com/office/drawing/2014/main" id="{AE560F0B-83D2-4070-BEF1-3BC21B8882C1}"/>
+                </a:ext>
+              </a:extLst>
+            </p:cNvPr>
+            <p:cNvPicPr>
+              <a:picLocks noChangeAspect="1"/>
+            </p:cNvPicPr>
+            <p:nvPr/>
+          </p:nvPicPr>
+          <p:blipFill rotWithShape="1">
+            <a:blip r:embed="rId2"/>
+            <a:srcRect l="61976" r="26340"/>
+            <a:stretch/>
+          </p:blipFill>
+          <p:spPr>
+            <a:xfrm rot="16923297">
+              <a:off x="6193226" y="1446290"/>
+              <a:ext cx="201028" cy="1720516"/>
+            </a:xfrm>
+            <a:prstGeom prst="rect">
+              <a:avLst/>
+            </a:prstGeom>
+          </p:spPr>
+        </p:pic>
+        <p:pic>
+          <p:nvPicPr>
+            <p:cNvPr id="12" name="Picture 11">
+              <a:extLst>
+                <a:ext uri="{FF2B5EF4-FFF2-40B4-BE49-F238E27FC236}">
+                  <a16:creationId xmlns:a16="http://schemas.microsoft.com/office/drawing/2014/main" id="{9FCA1D12-53AF-42BC-896C-1DB7A204FE5A}"/>
+                </a:ext>
+              </a:extLst>
+            </p:cNvPr>
+            <p:cNvPicPr>
+              <a:picLocks noChangeAspect="1"/>
+            </p:cNvPicPr>
+            <p:nvPr/>
+          </p:nvPicPr>
+          <p:blipFill rotWithShape="1">
+            <a:blip r:embed="rId2"/>
+            <a:srcRect l="26314" r="38627"/>
+            <a:stretch/>
+          </p:blipFill>
+          <p:spPr>
+            <a:xfrm>
+              <a:off x="5408791" y="1858882"/>
+              <a:ext cx="603125" cy="1720516"/>
+            </a:xfrm>
+            <a:prstGeom prst="rect">
+              <a:avLst/>
+            </a:prstGeom>
+          </p:spPr>
+        </p:pic>
+      </p:grpSp>
+      <p:grpSp>
+        <p:nvGrpSpPr>
+          <p:cNvPr id="6" name="Group 5">
+            <a:extLst>
+              <a:ext uri="{FF2B5EF4-FFF2-40B4-BE49-F238E27FC236}">
+                <a16:creationId xmlns:a16="http://schemas.microsoft.com/office/drawing/2014/main" id="{B4F3FAF5-C65B-42E2-ACC5-D2A644DD211D}"/>
+              </a:ext>
+            </a:extLst>
+          </p:cNvPr>
+          <p:cNvGrpSpPr/>
+          <p:nvPr/>
+        </p:nvGrpSpPr>
+        <p:grpSpPr>
+          <a:xfrm>
+            <a:off x="2776318" y="1849982"/>
+            <a:ext cx="764506" cy="762083"/>
+            <a:chOff x="2277647" y="1849982"/>
+            <a:chExt cx="1725987" cy="1720516"/>
+          </a:xfrm>
+        </p:grpSpPr>
+        <p:pic>
+          <p:nvPicPr>
+            <p:cNvPr id="10" name="Picture 9">
+              <a:extLst>
+                <a:ext uri="{FF2B5EF4-FFF2-40B4-BE49-F238E27FC236}">
+                  <a16:creationId xmlns:a16="http://schemas.microsoft.com/office/drawing/2014/main" id="{4F539A29-13AF-44F9-855F-76614E5BDFA1}"/>
+                </a:ext>
+              </a:extLst>
+            </p:cNvPr>
+            <p:cNvPicPr>
+              <a:picLocks noChangeAspect="1"/>
+            </p:cNvPicPr>
+            <p:nvPr/>
+          </p:nvPicPr>
+          <p:blipFill rotWithShape="1">
+            <a:blip r:embed="rId2"/>
+            <a:srcRect l="26458" r="61858"/>
+            <a:stretch/>
+          </p:blipFill>
+          <p:spPr>
+            <a:xfrm rot="4779514">
+              <a:off x="3037391" y="1433292"/>
+              <a:ext cx="201028" cy="1720516"/>
+            </a:xfrm>
+            <a:prstGeom prst="rect">
+              <a:avLst/>
+            </a:prstGeom>
+          </p:spPr>
+        </p:pic>
+        <p:pic>
+          <p:nvPicPr>
+            <p:cNvPr id="13" name="Picture 12">
+              <a:extLst>
+                <a:ext uri="{FF2B5EF4-FFF2-40B4-BE49-F238E27FC236}">
+                  <a16:creationId xmlns:a16="http://schemas.microsoft.com/office/drawing/2014/main" id="{19AA3CCD-4949-450C-8AA6-A76B8C3247CD}"/>
+                </a:ext>
+              </a:extLst>
+            </p:cNvPr>
+            <p:cNvPicPr>
+              <a:picLocks noChangeAspect="1"/>
+            </p:cNvPicPr>
+            <p:nvPr/>
+          </p:nvPicPr>
+          <p:blipFill rotWithShape="1">
+            <a:blip r:embed="rId2"/>
+            <a:srcRect l="38672" r="26269"/>
+            <a:stretch/>
+          </p:blipFill>
+          <p:spPr>
+            <a:xfrm>
+              <a:off x="3400508" y="1849982"/>
+              <a:ext cx="603126" cy="1720516"/>
+            </a:xfrm>
+            <a:prstGeom prst="rect">
+              <a:avLst/>
+            </a:prstGeom>
+          </p:spPr>
+        </p:pic>
+      </p:grpSp>
+      <p:grpSp>
+        <p:nvGrpSpPr>
+          <p:cNvPr id="11" name="Group 10">
+            <a:extLst>
+              <a:ext uri="{FF2B5EF4-FFF2-40B4-BE49-F238E27FC236}">
+                <a16:creationId xmlns:a16="http://schemas.microsoft.com/office/drawing/2014/main" id="{0AB48BA6-B9CA-467A-B6E3-D373EB107F9C}"/>
+              </a:ext>
+            </a:extLst>
+          </p:cNvPr>
+          <p:cNvGrpSpPr/>
+          <p:nvPr/>
+        </p:nvGrpSpPr>
+        <p:grpSpPr>
+          <a:xfrm>
+            <a:off x="7521189" y="1499787"/>
+            <a:ext cx="349250" cy="1098318"/>
+            <a:chOff x="7542448" y="1096897"/>
+            <a:chExt cx="788484" cy="2479617"/>
+          </a:xfrm>
+        </p:grpSpPr>
+        <p:pic>
+          <p:nvPicPr>
+            <p:cNvPr id="14" name="Picture 13">
+              <a:extLst>
+                <a:ext uri="{FF2B5EF4-FFF2-40B4-BE49-F238E27FC236}">
+                  <a16:creationId xmlns:a16="http://schemas.microsoft.com/office/drawing/2014/main" id="{DE681E61-5660-4C6F-83E6-F4CB4FA80E34}"/>
+                </a:ext>
+              </a:extLst>
+            </p:cNvPr>
+            <p:cNvPicPr>
+              <a:picLocks noChangeAspect="1"/>
+            </p:cNvPicPr>
+            <p:nvPr/>
+          </p:nvPicPr>
+          <p:blipFill rotWithShape="1">
+            <a:blip r:embed="rId2"/>
+            <a:srcRect l="38672" r="38627"/>
+            <a:stretch/>
+          </p:blipFill>
+          <p:spPr>
+            <a:xfrm>
+              <a:off x="7739378" y="1855998"/>
+              <a:ext cx="390525" cy="1720516"/>
+            </a:xfrm>
+            <a:prstGeom prst="rect">
+              <a:avLst/>
+            </a:prstGeom>
+          </p:spPr>
+        </p:pic>
+        <p:pic>
+          <p:nvPicPr>
+            <p:cNvPr id="17" name="Picture 16">
+              <a:extLst>
+                <a:ext uri="{FF2B5EF4-FFF2-40B4-BE49-F238E27FC236}">
+                  <a16:creationId xmlns:a16="http://schemas.microsoft.com/office/drawing/2014/main" id="{5BABC78B-7222-419D-AA52-7FB904698109}"/>
+                </a:ext>
+              </a:extLst>
+            </p:cNvPr>
+            <p:cNvPicPr>
+              <a:picLocks noChangeAspect="1"/>
+            </p:cNvPicPr>
+            <p:nvPr/>
+          </p:nvPicPr>
+          <p:blipFill rotWithShape="1">
+            <a:blip r:embed="rId2"/>
+            <a:srcRect l="61976" r="26340"/>
+            <a:stretch/>
+          </p:blipFill>
+          <p:spPr>
+            <a:xfrm rot="10800000">
+              <a:off x="7542448" y="1096897"/>
+              <a:ext cx="201028" cy="1720516"/>
+            </a:xfrm>
+            <a:prstGeom prst="rect">
+              <a:avLst/>
+            </a:prstGeom>
+          </p:spPr>
+        </p:pic>
+        <p:pic>
+          <p:nvPicPr>
+            <p:cNvPr id="18" name="Picture 17">
+              <a:extLst>
+                <a:ext uri="{FF2B5EF4-FFF2-40B4-BE49-F238E27FC236}">
+                  <a16:creationId xmlns:a16="http://schemas.microsoft.com/office/drawing/2014/main" id="{A6FA16F4-193F-41C5-A7F5-EAEA45A30879}"/>
+                </a:ext>
+              </a:extLst>
+            </p:cNvPr>
+            <p:cNvPicPr>
+              <a:picLocks noChangeAspect="1"/>
+            </p:cNvPicPr>
+            <p:nvPr/>
+          </p:nvPicPr>
+          <p:blipFill rotWithShape="1">
+            <a:blip r:embed="rId2"/>
+            <a:srcRect l="26458" r="61858"/>
+            <a:stretch/>
+          </p:blipFill>
+          <p:spPr>
+            <a:xfrm rot="10800000">
+              <a:off x="8129904" y="1096897"/>
+              <a:ext cx="201028" cy="1720516"/>
+            </a:xfrm>
+            <a:prstGeom prst="rect">
+              <a:avLst/>
+            </a:prstGeom>
+          </p:spPr>
+        </p:pic>
+      </p:grpSp>
+      <p:grpSp>
+        <p:nvGrpSpPr>
+          <p:cNvPr id="2" name="Group 1">
+            <a:extLst>
+              <a:ext uri="{FF2B5EF4-FFF2-40B4-BE49-F238E27FC236}">
+                <a16:creationId xmlns:a16="http://schemas.microsoft.com/office/drawing/2014/main" id="{96100662-F764-4117-9449-F7381378DA92}"/>
+              </a:ext>
+            </a:extLst>
+          </p:cNvPr>
+          <p:cNvGrpSpPr/>
+          <p:nvPr/>
+        </p:nvGrpSpPr>
+        <p:grpSpPr>
+          <a:xfrm>
+            <a:off x="280156" y="1846845"/>
+            <a:ext cx="1177097" cy="762083"/>
+            <a:chOff x="280156" y="1846845"/>
+            <a:chExt cx="2657473" cy="1720516"/>
+          </a:xfrm>
+        </p:grpSpPr>
+        <p:pic>
+          <p:nvPicPr>
+            <p:cNvPr id="16" name="Picture 15">
+              <a:extLst>
+                <a:ext uri="{FF2B5EF4-FFF2-40B4-BE49-F238E27FC236}">
+                  <a16:creationId xmlns:a16="http://schemas.microsoft.com/office/drawing/2014/main" id="{9C33FB8A-110D-401F-A19A-BFF0CBFE806E}"/>
+                </a:ext>
+              </a:extLst>
+            </p:cNvPr>
+            <p:cNvPicPr>
+              <a:picLocks noChangeAspect="1"/>
+            </p:cNvPicPr>
+            <p:nvPr/>
+          </p:nvPicPr>
+          <p:blipFill rotWithShape="1">
+            <a:blip r:embed="rId2"/>
+            <a:srcRect l="38672" r="38627"/>
+            <a:stretch/>
+          </p:blipFill>
+          <p:spPr>
+            <a:xfrm>
+              <a:off x="1411351" y="1846845"/>
+              <a:ext cx="390525" cy="1720516"/>
+            </a:xfrm>
+            <a:prstGeom prst="rect">
+              <a:avLst/>
+            </a:prstGeom>
+          </p:spPr>
+        </p:pic>
+        <p:pic>
+          <p:nvPicPr>
+            <p:cNvPr id="19" name="Picture 18">
+              <a:extLst>
+                <a:ext uri="{FF2B5EF4-FFF2-40B4-BE49-F238E27FC236}">
+                  <a16:creationId xmlns:a16="http://schemas.microsoft.com/office/drawing/2014/main" id="{88D1CD4D-F369-4F9D-92B6-E786DCAD0A16}"/>
+                </a:ext>
+              </a:extLst>
+            </p:cNvPr>
+            <p:cNvPicPr>
+              <a:picLocks noChangeAspect="1"/>
+            </p:cNvPicPr>
+            <p:nvPr/>
+          </p:nvPicPr>
+          <p:blipFill rotWithShape="1">
+            <a:blip r:embed="rId2"/>
+            <a:srcRect l="61976" r="26340"/>
+            <a:stretch/>
+          </p:blipFill>
+          <p:spPr>
+            <a:xfrm rot="16618695">
+              <a:off x="1976857" y="1410189"/>
+              <a:ext cx="201028" cy="1720516"/>
+            </a:xfrm>
+            <a:prstGeom prst="rect">
+              <a:avLst/>
+            </a:prstGeom>
+          </p:spPr>
+        </p:pic>
+        <p:pic>
+          <p:nvPicPr>
+            <p:cNvPr id="20" name="Picture 19">
+              <a:extLst>
+                <a:ext uri="{FF2B5EF4-FFF2-40B4-BE49-F238E27FC236}">
+                  <a16:creationId xmlns:a16="http://schemas.microsoft.com/office/drawing/2014/main" id="{FC4E9D9D-F91A-467B-8EFC-2B2E5D22A501}"/>
+                </a:ext>
+              </a:extLst>
+            </p:cNvPr>
+            <p:cNvPicPr>
+              <a:picLocks noChangeAspect="1"/>
+            </p:cNvPicPr>
+            <p:nvPr/>
+          </p:nvPicPr>
+          <p:blipFill rotWithShape="1">
+            <a:blip r:embed="rId2"/>
+            <a:srcRect l="26458" r="61858"/>
+            <a:stretch/>
+          </p:blipFill>
+          <p:spPr>
+            <a:xfrm rot="5102215">
+              <a:off x="1039900" y="1403207"/>
+              <a:ext cx="201028" cy="1720516"/>
+            </a:xfrm>
+            <a:prstGeom prst="rect">
+              <a:avLst/>
+            </a:prstGeom>
+          </p:spPr>
+        </p:pic>
+      </p:grpSp>
+      <p:sp>
+        <p:nvSpPr>
+          <p:cNvPr id="21" name="Arrow: Right 20">
+            <a:extLst>
+              <a:ext uri="{FF2B5EF4-FFF2-40B4-BE49-F238E27FC236}">
+                <a16:creationId xmlns:a16="http://schemas.microsoft.com/office/drawing/2014/main" id="{EAF09C02-6224-40DD-94BC-7BCE6CC01268}"/>
+              </a:ext>
+            </a:extLst>
+          </p:cNvPr>
+          <p:cNvSpPr/>
+          <p:nvPr/>
+        </p:nvSpPr>
+        <p:spPr>
+          <a:xfrm rot="10800000">
+            <a:off x="3657565" y="2047663"/>
+            <a:ext cx="596900" cy="349250"/>
+          </a:xfrm>
+          <a:prstGeom prst="rightArrow">
+            <a:avLst>
+              <a:gd name="adj1" fmla="val 50000"/>
+              <a:gd name="adj2" fmla="val 87500"/>
+            </a:avLst>
+          </a:prstGeom>
+          <a:gradFill flip="none" rotWithShape="1">
+            <a:gsLst>
+              <a:gs pos="0">
+                <a:schemeClr val="accent2">
+                  <a:lumMod val="67000"/>
+                </a:schemeClr>
+              </a:gs>
+              <a:gs pos="48000">
+                <a:schemeClr val="accent2">
+                  <a:lumMod val="97000"/>
+                  <a:lumOff val="3000"/>
+                </a:schemeClr>
+              </a:gs>
+              <a:gs pos="100000">
+                <a:schemeClr val="accent2">
+                  <a:lumMod val="60000"/>
+                  <a:lumOff val="40000"/>
+                </a:schemeClr>
+              </a:gs>
+            </a:gsLst>
+            <a:lin ang="16200000" scaled="1"/>
+            <a:tileRect/>
+          </a:gradFill>
+          <a:ln>
+            <a:noFill/>
+          </a:ln>
+        </p:spPr>
+        <p:style>
+          <a:lnRef idx="0">
+            <a:scrgbClr r="0" g="0" b="0"/>
+          </a:lnRef>
+          <a:fillRef idx="0">
+            <a:scrgbClr r="0" g="0" b="0"/>
+          </a:fillRef>
+          <a:effectRef idx="0">
+            <a:scrgbClr r="0" g="0" b="0"/>
+          </a:effectRef>
+          <a:fontRef idx="minor">
+            <a:schemeClr val="lt1"/>
+          </a:fontRef>
+        </p:style>
+        <p:txBody>
+          <a:bodyPr wrap="square" lIns="0" tIns="0" rIns="0" bIns="0" rtlCol="0" anchor="ctr">
+            <a:noAutofit/>
+          </a:bodyPr>
+          <a:lstStyle/>
+          <a:p>
+            <a:pPr algn="ctr"/>
+            <a:endParaRPr lang="de-CH" sz="700">
+              <a:latin typeface="Bahnschrift" panose="020B0502040204020203" pitchFamily="34" charset="0"/>
+            </a:endParaRPr>
+          </a:p>
+        </p:txBody>
+      </p:sp>
+      <p:sp>
+        <p:nvSpPr>
+          <p:cNvPr id="22" name="Arrow: Right 21">
+            <a:extLst>
+              <a:ext uri="{FF2B5EF4-FFF2-40B4-BE49-F238E27FC236}">
+                <a16:creationId xmlns:a16="http://schemas.microsoft.com/office/drawing/2014/main" id="{B2EED307-41EA-4239-8AA3-49EB8C8736BA}"/>
+              </a:ext>
+            </a:extLst>
+          </p:cNvPr>
+          <p:cNvSpPr/>
+          <p:nvPr/>
+        </p:nvSpPr>
+        <p:spPr>
+          <a:xfrm>
+            <a:off x="5964076" y="2047663"/>
+            <a:ext cx="596900" cy="349250"/>
+          </a:xfrm>
+          <a:prstGeom prst="rightArrow">
+            <a:avLst>
+              <a:gd name="adj1" fmla="val 50000"/>
+              <a:gd name="adj2" fmla="val 87500"/>
+            </a:avLst>
+          </a:prstGeom>
+          <a:gradFill flip="none" rotWithShape="1">
+            <a:gsLst>
+              <a:gs pos="0">
+                <a:schemeClr val="accent2">
+                  <a:lumMod val="67000"/>
+                </a:schemeClr>
+              </a:gs>
+              <a:gs pos="48000">
+                <a:schemeClr val="accent2">
+                  <a:lumMod val="97000"/>
+                  <a:lumOff val="3000"/>
+                </a:schemeClr>
+              </a:gs>
+              <a:gs pos="100000">
+                <a:schemeClr val="accent2">
+                  <a:lumMod val="60000"/>
+                  <a:lumOff val="40000"/>
+                </a:schemeClr>
+              </a:gs>
+            </a:gsLst>
+            <a:lin ang="16200000" scaled="1"/>
+            <a:tileRect/>
+          </a:gradFill>
+          <a:ln>
+            <a:noFill/>
+          </a:ln>
+        </p:spPr>
+        <p:style>
+          <a:lnRef idx="0">
+            <a:scrgbClr r="0" g="0" b="0"/>
+          </a:lnRef>
+          <a:fillRef idx="0">
+            <a:scrgbClr r="0" g="0" b="0"/>
+          </a:fillRef>
+          <a:effectRef idx="0">
+            <a:scrgbClr r="0" g="0" b="0"/>
+          </a:effectRef>
+          <a:fontRef idx="minor">
+            <a:schemeClr val="lt1"/>
+          </a:fontRef>
+        </p:style>
+        <p:txBody>
+          <a:bodyPr wrap="square" lIns="0" tIns="0" rIns="0" bIns="0" rtlCol="0" anchor="ctr">
+            <a:noAutofit/>
+          </a:bodyPr>
+          <a:lstStyle/>
+          <a:p>
+            <a:pPr algn="ctr"/>
+            <a:endParaRPr lang="de-CH" sz="700">
+              <a:latin typeface="Bahnschrift" panose="020B0502040204020203" pitchFamily="34" charset="0"/>
+            </a:endParaRPr>
+          </a:p>
+        </p:txBody>
+      </p:sp>
+      <p:sp>
+        <p:nvSpPr>
+          <p:cNvPr id="23" name="Arrow: Right 22">
+            <a:extLst>
+              <a:ext uri="{FF2B5EF4-FFF2-40B4-BE49-F238E27FC236}">
+                <a16:creationId xmlns:a16="http://schemas.microsoft.com/office/drawing/2014/main" id="{43FD78CB-4A69-4B05-9DBE-C70F8BA940A5}"/>
+              </a:ext>
+            </a:extLst>
+          </p:cNvPr>
+          <p:cNvSpPr/>
+          <p:nvPr/>
+        </p:nvSpPr>
+        <p:spPr>
+          <a:xfrm rot="16200000">
+            <a:off x="7839154" y="2047663"/>
+            <a:ext cx="596900" cy="349250"/>
+          </a:xfrm>
+          <a:prstGeom prst="rightArrow">
+            <a:avLst>
+              <a:gd name="adj1" fmla="val 50000"/>
+              <a:gd name="adj2" fmla="val 87500"/>
+            </a:avLst>
+          </a:prstGeom>
+          <a:gradFill flip="none" rotWithShape="1">
+            <a:gsLst>
+              <a:gs pos="0">
+                <a:schemeClr val="accent2">
+                  <a:lumMod val="67000"/>
+                </a:schemeClr>
+              </a:gs>
+              <a:gs pos="48000">
+                <a:schemeClr val="accent2">
+                  <a:lumMod val="97000"/>
+                  <a:lumOff val="3000"/>
+                </a:schemeClr>
+              </a:gs>
+              <a:gs pos="100000">
+                <a:schemeClr val="accent2">
+                  <a:lumMod val="60000"/>
+                  <a:lumOff val="40000"/>
+                </a:schemeClr>
+              </a:gs>
+            </a:gsLst>
+            <a:lin ang="16200000" scaled="1"/>
+            <a:tileRect/>
+          </a:gradFill>
+          <a:ln>
+            <a:noFill/>
+          </a:ln>
+        </p:spPr>
+        <p:style>
+          <a:lnRef idx="0">
+            <a:scrgbClr r="0" g="0" b="0"/>
+          </a:lnRef>
+          <a:fillRef idx="0">
+            <a:scrgbClr r="0" g="0" b="0"/>
+          </a:fillRef>
+          <a:effectRef idx="0">
+            <a:scrgbClr r="0" g="0" b="0"/>
+          </a:effectRef>
+          <a:fontRef idx="minor">
+            <a:schemeClr val="lt1"/>
+          </a:fontRef>
+        </p:style>
+        <p:txBody>
+          <a:bodyPr wrap="square" lIns="0" tIns="0" rIns="0" bIns="0" rtlCol="0" anchor="ctr">
+            <a:noAutofit/>
+          </a:bodyPr>
+          <a:lstStyle/>
+          <a:p>
+            <a:pPr algn="ctr"/>
+            <a:endParaRPr lang="de-CH" sz="700">
+              <a:latin typeface="Bahnschrift" panose="020B0502040204020203" pitchFamily="34" charset="0"/>
+            </a:endParaRPr>
+          </a:p>
+        </p:txBody>
+      </p:sp>
+      <p:sp>
+        <p:nvSpPr>
+          <p:cNvPr id="24" name="Arrow: Right 23">
+            <a:extLst>
+              <a:ext uri="{FF2B5EF4-FFF2-40B4-BE49-F238E27FC236}">
+                <a16:creationId xmlns:a16="http://schemas.microsoft.com/office/drawing/2014/main" id="{FF15029E-54DC-4DB7-82E4-C5F60C938F4A}"/>
+              </a:ext>
+            </a:extLst>
+          </p:cNvPr>
+          <p:cNvSpPr/>
+          <p:nvPr/>
+        </p:nvSpPr>
+        <p:spPr>
+          <a:xfrm rot="5400000">
+            <a:off x="10237710" y="2047663"/>
+            <a:ext cx="596900" cy="349250"/>
+          </a:xfrm>
+          <a:prstGeom prst="rightArrow">
+            <a:avLst>
+              <a:gd name="adj1" fmla="val 50000"/>
+              <a:gd name="adj2" fmla="val 87500"/>
+            </a:avLst>
+          </a:prstGeom>
+          <a:gradFill flip="none" rotWithShape="1">
+            <a:gsLst>
+              <a:gs pos="0">
+                <a:schemeClr val="accent2">
+                  <a:lumMod val="67000"/>
+                </a:schemeClr>
+              </a:gs>
+              <a:gs pos="48000">
+                <a:schemeClr val="accent2">
+                  <a:lumMod val="97000"/>
+                  <a:lumOff val="3000"/>
+                </a:schemeClr>
+              </a:gs>
+              <a:gs pos="100000">
+                <a:schemeClr val="accent2">
+                  <a:lumMod val="60000"/>
+                  <a:lumOff val="40000"/>
+                </a:schemeClr>
+              </a:gs>
+            </a:gsLst>
+            <a:lin ang="16200000" scaled="1"/>
+            <a:tileRect/>
+          </a:gradFill>
+          <a:ln>
+            <a:noFill/>
+          </a:ln>
+        </p:spPr>
+        <p:style>
+          <a:lnRef idx="0">
+            <a:scrgbClr r="0" g="0" b="0"/>
+          </a:lnRef>
+          <a:fillRef idx="0">
+            <a:scrgbClr r="0" g="0" b="0"/>
+          </a:fillRef>
+          <a:effectRef idx="0">
+            <a:scrgbClr r="0" g="0" b="0"/>
+          </a:effectRef>
+          <a:fontRef idx="minor">
+            <a:schemeClr val="lt1"/>
+          </a:fontRef>
+        </p:style>
+        <p:txBody>
+          <a:bodyPr wrap="square" lIns="0" tIns="0" rIns="0" bIns="0" rtlCol="0" anchor="ctr">
+            <a:noAutofit/>
+          </a:bodyPr>
+          <a:lstStyle/>
+          <a:p>
+            <a:pPr algn="ctr"/>
+            <a:endParaRPr lang="de-CH" sz="700">
+              <a:latin typeface="Bahnschrift" panose="020B0502040204020203" pitchFamily="34" charset="0"/>
+            </a:endParaRPr>
+          </a:p>
+        </p:txBody>
+      </p:sp>
+      <p:sp>
+        <p:nvSpPr>
+          <p:cNvPr id="25" name="Octagon 24">
+            <a:extLst>
+              <a:ext uri="{FF2B5EF4-FFF2-40B4-BE49-F238E27FC236}">
+                <a16:creationId xmlns:a16="http://schemas.microsoft.com/office/drawing/2014/main" id="{BCFB97E0-C2D8-4B8F-9AA4-D28765E1D168}"/>
+              </a:ext>
+            </a:extLst>
+          </p:cNvPr>
+          <p:cNvSpPr/>
+          <p:nvPr/>
+        </p:nvSpPr>
+        <p:spPr>
+          <a:xfrm>
+            <a:off x="1229723" y="1947650"/>
+            <a:ext cx="549277" cy="549277"/>
+          </a:xfrm>
+          <a:prstGeom prst="octagon">
+            <a:avLst/>
+          </a:prstGeom>
+          <a:gradFill flip="none" rotWithShape="1">
+            <a:gsLst>
+              <a:gs pos="0">
+                <a:schemeClr val="accent2">
+                  <a:lumMod val="67000"/>
+                </a:schemeClr>
+              </a:gs>
+              <a:gs pos="48000">
+                <a:schemeClr val="accent2">
+                  <a:lumMod val="97000"/>
+                  <a:lumOff val="3000"/>
+                </a:schemeClr>
+              </a:gs>
+              <a:gs pos="100000">
+                <a:schemeClr val="accent2">
+                  <a:lumMod val="60000"/>
+                  <a:lumOff val="40000"/>
+                </a:schemeClr>
+              </a:gs>
+            </a:gsLst>
+            <a:lin ang="16200000" scaled="1"/>
+            <a:tileRect/>
+          </a:gradFill>
+          <a:ln>
+            <a:noFill/>
+          </a:ln>
+        </p:spPr>
+        <p:style>
+          <a:lnRef idx="0">
+            <a:scrgbClr r="0" g="0" b="0"/>
+          </a:lnRef>
+          <a:fillRef idx="0">
+            <a:scrgbClr r="0" g="0" b="0"/>
+          </a:fillRef>
+          <a:effectRef idx="0">
+            <a:scrgbClr r="0" g="0" b="0"/>
+          </a:effectRef>
+          <a:fontRef idx="minor">
+            <a:schemeClr val="lt1"/>
+          </a:fontRef>
+        </p:style>
+        <p:txBody>
+          <a:bodyPr wrap="square" lIns="0" tIns="0" rIns="0" bIns="0" rtlCol="0" anchor="ctr">
+            <a:noAutofit/>
+          </a:bodyPr>
+          <a:lstStyle/>
+          <a:p>
+            <a:pPr algn="ctr"/>
+            <a:r>
+              <a:rPr lang="de-CH" sz="1200" b="1" dirty="0">
+                <a:latin typeface="Bahnschrift" panose="020B0502040204020203" pitchFamily="34" charset="0"/>
+              </a:rPr>
+              <a:t>STOP</a:t>
+            </a:r>
+          </a:p>
+        </p:txBody>
+      </p:sp>
+    </p:spTree>
+    <p:extLst>
+      <p:ext uri="{BB962C8B-B14F-4D97-AF65-F5344CB8AC3E}">
+        <p14:creationId xmlns:p14="http://schemas.microsoft.com/office/powerpoint/2010/main" val="1803163517"/>
+      </p:ext>
+    </p:extLst>
+  </p:cSld>
+  <p:clrMapOvr>
+    <a:masterClrMapping/>
+  </p:clrMapOvr>
+</p:sld>
+</file>
+
+<file path=ppt/slides/slide5.xml><?xml version="1.0" encoding="utf-8"?>
 <p:sld xmlns:a="http://schemas.openxmlformats.org/drawingml/2006/main" xmlns:r="http://schemas.openxmlformats.org/officeDocument/2006/relationships" xmlns:p="http://schemas.openxmlformats.org/presentationml/2006/main">
   <p:cSld>
     <p:spTree>
@@ -20598,17 +21506,6 @@
 </file>
 
 <file path=customXml/item1.xml><?xml version="1.0" encoding="utf-8"?>
-<p:properties xmlns:p="http://schemas.microsoft.com/office/2006/metadata/properties" xmlns:xsi="http://www.w3.org/2001/XMLSchema-instance" xmlns:pc="http://schemas.microsoft.com/office/infopath/2007/PartnerControls">
-  <documentManagement>
-    <Work_x0020_Stream xmlns="6c79e6ef-b650-4ae2-a3e7-0dc2221587ce">IT</Work_x0020_Stream>
-    <Main_x0020_Document xmlns="6c79e6ef-b650-4ae2-a3e7-0dc2221587ce">true</Main_x0020_Document>
-    <PublishingExpirationDate xmlns="http://schemas.microsoft.com/sharepoint/v3" xsi:nil="true"/>
-    <PublishingStartDate xmlns="http://schemas.microsoft.com/sharepoint/v3" xsi:nil="true"/>
-  </documentManagement>
-</p:properties>
-</file>
-
-<file path=customXml/item2.xml><?xml version="1.0" encoding="utf-8"?>
 <ct:contentTypeSchema xmlns:ct="http://schemas.microsoft.com/office/2006/metadata/contentType" xmlns:ma="http://schemas.microsoft.com/office/2006/metadata/properties/metaAttributes" ct:_="" ma:_="" ma:contentTypeName="Document" ma:contentTypeID="0x0101007BD63474F9A1244CB84D2F6294160423" ma:contentTypeVersion="7" ma:contentTypeDescription="Create a new document." ma:contentTypeScope="" ma:versionID="5a1221ddbc0ba3e3858858679abb180a">
   <xsd:schema xmlns:xsd="http://www.w3.org/2001/XMLSchema" xmlns:xs="http://www.w3.org/2001/XMLSchema" xmlns:p="http://schemas.microsoft.com/office/2006/metadata/properties" xmlns:ns1="http://schemas.microsoft.com/sharepoint/v3" xmlns:ns2="6c79e6ef-b650-4ae2-a3e7-0dc2221587ce" targetNamespace="http://schemas.microsoft.com/office/2006/metadata/properties" ma:root="true" ma:fieldsID="3cf6cfb97e8ba97dedafa0947be48ff6" ns1:_="" ns2:_="">
     <xsd:import namespace="http://schemas.microsoft.com/sharepoint/v3"/>
@@ -20787,6 +21684,17 @@
 </ct:contentTypeSchema>
 </file>
 
+<file path=customXml/item2.xml><?xml version="1.0" encoding="utf-8"?>
+<p:properties xmlns:p="http://schemas.microsoft.com/office/2006/metadata/properties" xmlns:xsi="http://www.w3.org/2001/XMLSchema-instance" xmlns:pc="http://schemas.microsoft.com/office/infopath/2007/PartnerControls">
+  <documentManagement>
+    <Work_x0020_Stream xmlns="6c79e6ef-b650-4ae2-a3e7-0dc2221587ce">IT</Work_x0020_Stream>
+    <Main_x0020_Document xmlns="6c79e6ef-b650-4ae2-a3e7-0dc2221587ce">true</Main_x0020_Document>
+    <PublishingExpirationDate xmlns="http://schemas.microsoft.com/sharepoint/v3" xsi:nil="true"/>
+    <PublishingStartDate xmlns="http://schemas.microsoft.com/sharepoint/v3" xsi:nil="true"/>
+  </documentManagement>
+</p:properties>
+</file>
+
 <file path=customXml/item3.xml><?xml version="1.0" encoding="utf-8"?>
 <?mso-contentType ?>
 <FormTemplates xmlns="http://schemas.microsoft.com/sharepoint/v3/contenttype/forms">
@@ -20797,23 +21705,6 @@
 </file>
 
 <file path=customXml/itemProps1.xml><?xml version="1.0" encoding="utf-8"?>
-<ds:datastoreItem xmlns:ds="http://schemas.openxmlformats.org/officeDocument/2006/customXml" ds:itemID="{305A3AD2-4115-41C7-9856-2EE5AE165F38}">
-  <ds:schemaRefs>
-    <ds:schemaRef ds:uri="http://schemas.microsoft.com/sharepoint/v3"/>
-    <ds:schemaRef ds:uri="http://schemas.microsoft.com/office/infopath/2007/PartnerControls"/>
-    <ds:schemaRef ds:uri="http://purl.org/dc/elements/1.1/"/>
-    <ds:schemaRef ds:uri="http://schemas.microsoft.com/office/2006/metadata/properties"/>
-    <ds:schemaRef ds:uri="http://purl.org/dc/terms/"/>
-    <ds:schemaRef ds:uri="http://schemas.microsoft.com/office/2006/documentManagement/types"/>
-    <ds:schemaRef ds:uri="http://purl.org/dc/dcmitype/"/>
-    <ds:schemaRef ds:uri="http://www.w3.org/XML/1998/namespace"/>
-    <ds:schemaRef ds:uri="http://schemas.openxmlformats.org/package/2006/metadata/core-properties"/>
-    <ds:schemaRef ds:uri="6c79e6ef-b650-4ae2-a3e7-0dc2221587ce"/>
-  </ds:schemaRefs>
-</ds:datastoreItem>
-</file>
-
-<file path=customXml/itemProps2.xml><?xml version="1.0" encoding="utf-8"?>
 <ds:datastoreItem xmlns:ds="http://schemas.openxmlformats.org/officeDocument/2006/customXml" ds:itemID="{49702C85-486C-47A6-97E2-EC4DBCFABB1C}">
   <ds:schemaRefs>
     <ds:schemaRef ds:uri="http://schemas.microsoft.com/office/2006/metadata/contentType"/>
@@ -20832,6 +21723,23 @@
 </ds:datastoreItem>
 </file>
 
+<file path=customXml/itemProps2.xml><?xml version="1.0" encoding="utf-8"?>
+<ds:datastoreItem xmlns:ds="http://schemas.openxmlformats.org/officeDocument/2006/customXml" ds:itemID="{305A3AD2-4115-41C7-9856-2EE5AE165F38}">
+  <ds:schemaRefs>
+    <ds:schemaRef ds:uri="http://schemas.microsoft.com/sharepoint/v3"/>
+    <ds:schemaRef ds:uri="http://schemas.microsoft.com/office/infopath/2007/PartnerControls"/>
+    <ds:schemaRef ds:uri="http://purl.org/dc/elements/1.1/"/>
+    <ds:schemaRef ds:uri="http://schemas.microsoft.com/office/2006/metadata/properties"/>
+    <ds:schemaRef ds:uri="http://purl.org/dc/terms/"/>
+    <ds:schemaRef ds:uri="http://schemas.microsoft.com/office/2006/documentManagement/types"/>
+    <ds:schemaRef ds:uri="http://purl.org/dc/dcmitype/"/>
+    <ds:schemaRef ds:uri="http://www.w3.org/XML/1998/namespace"/>
+    <ds:schemaRef ds:uri="http://schemas.openxmlformats.org/package/2006/metadata/core-properties"/>
+    <ds:schemaRef ds:uri="6c79e6ef-b650-4ae2-a3e7-0dc2221587ce"/>
+  </ds:schemaRefs>
+</ds:datastoreItem>
+</file>
+
 <file path=customXml/itemProps3.xml><?xml version="1.0" encoding="utf-8"?>
 <ds:datastoreItem xmlns:ds="http://schemas.openxmlformats.org/officeDocument/2006/customXml" ds:itemID="{38F74CC0-5B3F-43D6-A413-C310062ABF7D}">
   <ds:schemaRefs>

</xml_diff>